<commit_message>
Made progress on report
</commit_message>
<xml_diff>
--- a/ECE_8770/project_1/report/figs/Architectures.pptx
+++ b/ECE_8770/project_1/report/figs/Architectures.pptx
@@ -7,7 +7,10 @@
   <p:sldIdLst>
     <p:sldId id="256" r:id="rId2"/>
     <p:sldId id="257" r:id="rId3"/>
-    <p:sldId id="258" r:id="rId4"/>
+    <p:sldId id="260" r:id="rId4"/>
+    <p:sldId id="258" r:id="rId5"/>
+    <p:sldId id="261" r:id="rId6"/>
+    <p:sldId id="262" r:id="rId7"/>
   </p:sldIdLst>
   <p:sldSz cx="12192000" cy="6858000"/>
   <p:notesSz cx="6858000" cy="9144000"/>
@@ -108,7 +111,18 @@
   </p:defaultTextStyle>
   <p:extLst>
     <p:ext uri="{EFAFB233-063F-42B5-8137-9DF3F51BA10A}">
-      <p15:sldGuideLst xmlns:p15="http://schemas.microsoft.com/office/powerpoint/2012/main"/>
+      <p15:sldGuideLst xmlns:p15="http://schemas.microsoft.com/office/powerpoint/2012/main">
+        <p15:guide id="1" orient="horz" pos="2160" userDrawn="1">
+          <p15:clr>
+            <a:srgbClr val="A4A3A4"/>
+          </p15:clr>
+        </p15:guide>
+        <p15:guide id="2" pos="3840" userDrawn="1">
+          <p15:clr>
+            <a:srgbClr val="A4A3A4"/>
+          </p15:clr>
+        </p15:guide>
+      </p15:sldGuideLst>
     </p:ext>
   </p:extLst>
 </p:presentation>
@@ -261,7 +275,7 @@
           <a:p>
             <a:fld id="{FC915C06-3EAB-4D8C-8358-2B66BEB0EB43}" type="datetimeFigureOut">
               <a:rPr lang="en-US" smtClean="0"/>
-              <a:t>2/28/2024</a:t>
+              <a:t>2/29/2024</a:t>
             </a:fld>
             <a:endParaRPr lang="en-US"/>
           </a:p>
@@ -459,7 +473,7 @@
           <a:p>
             <a:fld id="{FC915C06-3EAB-4D8C-8358-2B66BEB0EB43}" type="datetimeFigureOut">
               <a:rPr lang="en-US" smtClean="0"/>
-              <a:t>2/28/2024</a:t>
+              <a:t>2/29/2024</a:t>
             </a:fld>
             <a:endParaRPr lang="en-US"/>
           </a:p>
@@ -667,7 +681,7 @@
           <a:p>
             <a:fld id="{FC915C06-3EAB-4D8C-8358-2B66BEB0EB43}" type="datetimeFigureOut">
               <a:rPr lang="en-US" smtClean="0"/>
-              <a:t>2/28/2024</a:t>
+              <a:t>2/29/2024</a:t>
             </a:fld>
             <a:endParaRPr lang="en-US"/>
           </a:p>
@@ -865,7 +879,7 @@
           <a:p>
             <a:fld id="{FC915C06-3EAB-4D8C-8358-2B66BEB0EB43}" type="datetimeFigureOut">
               <a:rPr lang="en-US" smtClean="0"/>
-              <a:t>2/28/2024</a:t>
+              <a:t>2/29/2024</a:t>
             </a:fld>
             <a:endParaRPr lang="en-US"/>
           </a:p>
@@ -1140,7 +1154,7 @@
           <a:p>
             <a:fld id="{FC915C06-3EAB-4D8C-8358-2B66BEB0EB43}" type="datetimeFigureOut">
               <a:rPr lang="en-US" smtClean="0"/>
-              <a:t>2/28/2024</a:t>
+              <a:t>2/29/2024</a:t>
             </a:fld>
             <a:endParaRPr lang="en-US"/>
           </a:p>
@@ -1405,7 +1419,7 @@
           <a:p>
             <a:fld id="{FC915C06-3EAB-4D8C-8358-2B66BEB0EB43}" type="datetimeFigureOut">
               <a:rPr lang="en-US" smtClean="0"/>
-              <a:t>2/28/2024</a:t>
+              <a:t>2/29/2024</a:t>
             </a:fld>
             <a:endParaRPr lang="en-US"/>
           </a:p>
@@ -1817,7 +1831,7 @@
           <a:p>
             <a:fld id="{FC915C06-3EAB-4D8C-8358-2B66BEB0EB43}" type="datetimeFigureOut">
               <a:rPr lang="en-US" smtClean="0"/>
-              <a:t>2/28/2024</a:t>
+              <a:t>2/29/2024</a:t>
             </a:fld>
             <a:endParaRPr lang="en-US"/>
           </a:p>
@@ -1958,7 +1972,7 @@
           <a:p>
             <a:fld id="{FC915C06-3EAB-4D8C-8358-2B66BEB0EB43}" type="datetimeFigureOut">
               <a:rPr lang="en-US" smtClean="0"/>
-              <a:t>2/28/2024</a:t>
+              <a:t>2/29/2024</a:t>
             </a:fld>
             <a:endParaRPr lang="en-US"/>
           </a:p>
@@ -2071,7 +2085,7 @@
           <a:p>
             <a:fld id="{FC915C06-3EAB-4D8C-8358-2B66BEB0EB43}" type="datetimeFigureOut">
               <a:rPr lang="en-US" smtClean="0"/>
-              <a:t>2/28/2024</a:t>
+              <a:t>2/29/2024</a:t>
             </a:fld>
             <a:endParaRPr lang="en-US"/>
           </a:p>
@@ -2382,7 +2396,7 @@
           <a:p>
             <a:fld id="{FC915C06-3EAB-4D8C-8358-2B66BEB0EB43}" type="datetimeFigureOut">
               <a:rPr lang="en-US" smtClean="0"/>
-              <a:t>2/28/2024</a:t>
+              <a:t>2/29/2024</a:t>
             </a:fld>
             <a:endParaRPr lang="en-US"/>
           </a:p>
@@ -2670,7 +2684,7 @@
           <a:p>
             <a:fld id="{FC915C06-3EAB-4D8C-8358-2B66BEB0EB43}" type="datetimeFigureOut">
               <a:rPr lang="en-US" smtClean="0"/>
-              <a:t>2/28/2024</a:t>
+              <a:t>2/29/2024</a:t>
             </a:fld>
             <a:endParaRPr lang="en-US"/>
           </a:p>
@@ -2911,7 +2925,7 @@
           <a:p>
             <a:fld id="{FC915C06-3EAB-4D8C-8358-2B66BEB0EB43}" type="datetimeFigureOut">
               <a:rPr lang="en-US" smtClean="0"/>
-              <a:t>2/28/2024</a:t>
+              <a:t>2/29/2024</a:t>
             </a:fld>
             <a:endParaRPr lang="en-US"/>
           </a:p>
@@ -3651,12 +3665,95 @@
           <a:chExt cx="0" cy="0"/>
         </a:xfrm>
       </p:grpSpPr>
+      <p:sp>
+        <p:nvSpPr>
+          <p:cNvPr id="2" name="Title 1">
+            <a:extLst>
+              <a:ext uri="{FF2B5EF4-FFF2-40B4-BE49-F238E27FC236}">
+                <a16:creationId xmlns:a16="http://schemas.microsoft.com/office/drawing/2014/main" id="{E065F570-4CAF-7A52-E7B1-0C19FB244DBC}"/>
+              </a:ext>
+            </a:extLst>
+          </p:cNvPr>
+          <p:cNvSpPr>
+            <a:spLocks noGrp="1"/>
+          </p:cNvSpPr>
+          <p:nvPr>
+            <p:ph type="title"/>
+          </p:nvPr>
+        </p:nvSpPr>
+        <p:spPr/>
+        <p:txBody>
+          <a:bodyPr/>
+          <a:lstStyle/>
+          <a:p>
+            <a:r>
+              <a:rPr lang="en-US" dirty="0"/>
+              <a:t>Accuracy</a:t>
+            </a:r>
+          </a:p>
+        </p:txBody>
+      </p:sp>
+      <p:sp>
+        <p:nvSpPr>
+          <p:cNvPr id="3" name="Content Placeholder 2">
+            <a:extLst>
+              <a:ext uri="{FF2B5EF4-FFF2-40B4-BE49-F238E27FC236}">
+                <a16:creationId xmlns:a16="http://schemas.microsoft.com/office/drawing/2014/main" id="{12B5BDD0-43C9-E441-B691-BB563932E5ED}"/>
+              </a:ext>
+            </a:extLst>
+          </p:cNvPr>
+          <p:cNvSpPr>
+            <a:spLocks noGrp="1"/>
+          </p:cNvSpPr>
+          <p:nvPr>
+            <p:ph idx="1"/>
+          </p:nvPr>
+        </p:nvSpPr>
+        <p:spPr/>
+        <p:txBody>
+          <a:bodyPr/>
+          <a:lstStyle/>
+          <a:p>
+            <a:endParaRPr lang="en-US"/>
+          </a:p>
+        </p:txBody>
+      </p:sp>
+    </p:spTree>
+    <p:extLst>
+      <p:ext uri="{BB962C8B-B14F-4D97-AF65-F5344CB8AC3E}">
+        <p14:creationId xmlns:p14="http://schemas.microsoft.com/office/powerpoint/2010/main" val="773751596"/>
+      </p:ext>
+    </p:extLst>
+  </p:cSld>
+  <p:clrMapOvr>
+    <a:masterClrMapping/>
+  </p:clrMapOvr>
+</p:sld>
+</file>
+
+<file path=ppt/slides/slide4.xml><?xml version="1.0" encoding="utf-8"?>
+<p:sld xmlns:a="http://schemas.openxmlformats.org/drawingml/2006/main" xmlns:r="http://schemas.openxmlformats.org/officeDocument/2006/relationships" xmlns:p="http://schemas.openxmlformats.org/presentationml/2006/main">
+  <p:cSld>
+    <p:spTree>
+      <p:nvGrpSpPr>
+        <p:cNvPr id="1" name=""/>
+        <p:cNvGrpSpPr/>
+        <p:nvPr/>
+      </p:nvGrpSpPr>
+      <p:grpSpPr>
+        <a:xfrm>
+          <a:off x="0" y="0"/>
+          <a:ext cx="0" cy="0"/>
+          <a:chOff x="0" y="0"/>
+          <a:chExt cx="0" cy="0"/>
+        </a:xfrm>
+      </p:grpSpPr>
       <p:grpSp>
         <p:nvGrpSpPr>
-          <p:cNvPr id="17" name="Group 16">
-            <a:extLst>
-              <a:ext uri="{FF2B5EF4-FFF2-40B4-BE49-F238E27FC236}">
-                <a16:creationId xmlns:a16="http://schemas.microsoft.com/office/drawing/2014/main" id="{11FEEA60-631D-D830-7197-57F9C3C75243}"/>
+          <p:cNvPr id="2" name="Group 1">
+            <a:extLst>
+              <a:ext uri="{FF2B5EF4-FFF2-40B4-BE49-F238E27FC236}">
+                <a16:creationId xmlns:a16="http://schemas.microsoft.com/office/drawing/2014/main" id="{C588D775-3FFF-F1E6-CD80-5B5167A7174F}"/>
               </a:ext>
             </a:extLst>
           </p:cNvPr>
@@ -3665,51 +3762,365 @@
         </p:nvGrpSpPr>
         <p:grpSpPr>
           <a:xfrm>
-            <a:off x="0" y="1883753"/>
-            <a:ext cx="12192000" cy="3090494"/>
-            <a:chOff x="0" y="1883753"/>
-            <a:chExt cx="12192000" cy="3090494"/>
+            <a:off x="9927123" y="1074627"/>
+            <a:ext cx="1493299" cy="923769"/>
+            <a:chOff x="10283689" y="2293145"/>
+            <a:chExt cx="1490868" cy="923769"/>
           </a:xfrm>
         </p:grpSpPr>
-        <p:pic>
-          <p:nvPicPr>
-            <p:cNvPr id="5" name="Graphic 4">
+        <p:sp>
+          <p:nvSpPr>
+            <p:cNvPr id="3" name="Oval 2">
               <a:extLst>
                 <a:ext uri="{FF2B5EF4-FFF2-40B4-BE49-F238E27FC236}">
-                  <a16:creationId xmlns:a16="http://schemas.microsoft.com/office/drawing/2014/main" id="{3B32FEB2-1E48-07D7-B9E6-654E0BEEBF1C}"/>
+                  <a16:creationId xmlns:a16="http://schemas.microsoft.com/office/drawing/2014/main" id="{795AFE99-76EC-54D5-F02D-3DB4F06F3F4D}"/>
                 </a:ext>
               </a:extLst>
             </p:cNvPr>
-            <p:cNvPicPr>
-              <a:picLocks noChangeAspect="1"/>
-            </p:cNvPicPr>
+            <p:cNvSpPr/>
             <p:nvPr/>
-          </p:nvPicPr>
-          <p:blipFill>
-            <a:blip r:embed="rId2">
+          </p:nvSpPr>
+          <p:spPr>
+            <a:xfrm>
+              <a:off x="10283689" y="2343369"/>
+              <a:ext cx="145774" cy="145774"/>
+            </a:xfrm>
+            <a:prstGeom prst="ellipse">
+              <a:avLst/>
+            </a:prstGeom>
+          </p:spPr>
+          <p:style>
+            <a:lnRef idx="2">
+              <a:schemeClr val="accent2">
+                <a:shade val="15000"/>
+              </a:schemeClr>
+            </a:lnRef>
+            <a:fillRef idx="1">
+              <a:schemeClr val="accent2"/>
+            </a:fillRef>
+            <a:effectRef idx="0">
+              <a:schemeClr val="accent2"/>
+            </a:effectRef>
+            <a:fontRef idx="minor">
+              <a:schemeClr val="lt1"/>
+            </a:fontRef>
+          </p:style>
+          <p:txBody>
+            <a:bodyPr rtlCol="0" anchor="ctr"/>
+            <a:lstStyle/>
+            <a:p>
+              <a:pPr algn="ctr"/>
+              <a:endParaRPr lang="en-US" dirty="0"/>
+            </a:p>
+          </p:txBody>
+        </p:sp>
+        <p:sp>
+          <p:nvSpPr>
+            <p:cNvPr id="4" name="Oval 3">
               <a:extLst>
-                <a:ext uri="{28A0092B-C50C-407E-A947-70E740481C1C}">
-                  <a14:useLocalDpi xmlns:a14="http://schemas.microsoft.com/office/drawing/2010/main" val="0"/>
-                </a:ext>
-                <a:ext uri="{96DAC541-7B7A-43D3-8B79-37D633B846F1}">
-                  <asvg:svgBlip xmlns:asvg="http://schemas.microsoft.com/office/drawing/2016/SVG/main" r:embed="rId3"/>
+                <a:ext uri="{FF2B5EF4-FFF2-40B4-BE49-F238E27FC236}">
+                  <a16:creationId xmlns:a16="http://schemas.microsoft.com/office/drawing/2014/main" id="{BFB100E1-C412-84F3-B02B-5D76D6DE000A}"/>
                 </a:ext>
               </a:extLst>
-            </a:blip>
-            <a:stretch>
-              <a:fillRect/>
-            </a:stretch>
-          </p:blipFill>
+            </p:cNvPr>
+            <p:cNvSpPr/>
+            <p:nvPr/>
+          </p:nvSpPr>
           <p:spPr>
             <a:xfrm>
-              <a:off x="0" y="1883753"/>
-              <a:ext cx="12192000" cy="3090494"/>
+              <a:off x="10283689" y="2563974"/>
+              <a:ext cx="145774" cy="145774"/>
+            </a:xfrm>
+            <a:prstGeom prst="ellipse">
+              <a:avLst/>
+            </a:prstGeom>
+          </p:spPr>
+          <p:style>
+            <a:lnRef idx="2">
+              <a:schemeClr val="accent1">
+                <a:shade val="15000"/>
+              </a:schemeClr>
+            </a:lnRef>
+            <a:fillRef idx="1">
+              <a:schemeClr val="accent1"/>
+            </a:fillRef>
+            <a:effectRef idx="0">
+              <a:schemeClr val="accent1"/>
+            </a:effectRef>
+            <a:fontRef idx="minor">
+              <a:schemeClr val="lt1"/>
+            </a:fontRef>
+          </p:style>
+          <p:txBody>
+            <a:bodyPr rtlCol="0" anchor="ctr"/>
+            <a:lstStyle/>
+            <a:p>
+              <a:pPr algn="ctr"/>
+              <a:endParaRPr lang="en-US"/>
+            </a:p>
+          </p:txBody>
+        </p:sp>
+        <p:sp>
+          <p:nvSpPr>
+            <p:cNvPr id="6" name="Oval 5">
+              <a:extLst>
+                <a:ext uri="{FF2B5EF4-FFF2-40B4-BE49-F238E27FC236}">
+                  <a16:creationId xmlns:a16="http://schemas.microsoft.com/office/drawing/2014/main" id="{F9DC7D12-C197-C6AA-178C-7DC85EB68FF8}"/>
+                </a:ext>
+              </a:extLst>
+            </p:cNvPr>
+            <p:cNvSpPr/>
+            <p:nvPr/>
+          </p:nvSpPr>
+          <p:spPr>
+            <a:xfrm>
+              <a:off x="10283689" y="2784579"/>
+              <a:ext cx="145774" cy="145774"/>
+            </a:xfrm>
+            <a:prstGeom prst="ellipse">
+              <a:avLst/>
+            </a:prstGeom>
+          </p:spPr>
+          <p:style>
+            <a:lnRef idx="2">
+              <a:schemeClr val="accent4">
+                <a:shade val="15000"/>
+              </a:schemeClr>
+            </a:lnRef>
+            <a:fillRef idx="1">
+              <a:schemeClr val="accent4"/>
+            </a:fillRef>
+            <a:effectRef idx="0">
+              <a:schemeClr val="accent4"/>
+            </a:effectRef>
+            <a:fontRef idx="minor">
+              <a:schemeClr val="lt1"/>
+            </a:fontRef>
+          </p:style>
+          <p:txBody>
+            <a:bodyPr rtlCol="0" anchor="ctr"/>
+            <a:lstStyle/>
+            <a:p>
+              <a:pPr algn="ctr"/>
+              <a:endParaRPr lang="en-US"/>
+            </a:p>
+          </p:txBody>
+        </p:sp>
+        <p:sp>
+          <p:nvSpPr>
+            <p:cNvPr id="7" name="Oval 6">
+              <a:extLst>
+                <a:ext uri="{FF2B5EF4-FFF2-40B4-BE49-F238E27FC236}">
+                  <a16:creationId xmlns:a16="http://schemas.microsoft.com/office/drawing/2014/main" id="{F3148883-83E5-2AE3-42DF-9D7E53DA8722}"/>
+                </a:ext>
+              </a:extLst>
+            </p:cNvPr>
+            <p:cNvSpPr/>
+            <p:nvPr/>
+          </p:nvSpPr>
+          <p:spPr>
+            <a:xfrm>
+              <a:off x="10283689" y="3005184"/>
+              <a:ext cx="145774" cy="145774"/>
+            </a:xfrm>
+            <a:prstGeom prst="ellipse">
+              <a:avLst/>
+            </a:prstGeom>
+            <a:solidFill>
+              <a:srgbClr val="C00000"/>
+            </a:solidFill>
+          </p:spPr>
+          <p:style>
+            <a:lnRef idx="2">
+              <a:schemeClr val="accent2">
+                <a:shade val="15000"/>
+              </a:schemeClr>
+            </a:lnRef>
+            <a:fillRef idx="1">
+              <a:schemeClr val="accent2"/>
+            </a:fillRef>
+            <a:effectRef idx="0">
+              <a:schemeClr val="accent2"/>
+            </a:effectRef>
+            <a:fontRef idx="minor">
+              <a:schemeClr val="lt1"/>
+            </a:fontRef>
+          </p:style>
+          <p:txBody>
+            <a:bodyPr rtlCol="0" anchor="ctr"/>
+            <a:lstStyle/>
+            <a:p>
+              <a:pPr algn="ctr"/>
+              <a:endParaRPr lang="en-US"/>
+            </a:p>
+          </p:txBody>
+        </p:sp>
+        <p:sp>
+          <p:nvSpPr>
+            <p:cNvPr id="18" name="TextBox 17">
+              <a:extLst>
+                <a:ext uri="{FF2B5EF4-FFF2-40B4-BE49-F238E27FC236}">
+                  <a16:creationId xmlns:a16="http://schemas.microsoft.com/office/drawing/2014/main" id="{32348B61-2029-37CD-859C-9D94906A9AF8}"/>
+                </a:ext>
+              </a:extLst>
+            </p:cNvPr>
+            <p:cNvSpPr txBox="1"/>
+            <p:nvPr/>
+          </p:nvSpPr>
+          <p:spPr>
+            <a:xfrm>
+              <a:off x="10508974" y="2293145"/>
+              <a:ext cx="1265583" cy="246221"/>
             </a:xfrm>
             <a:prstGeom prst="rect">
               <a:avLst/>
             </a:prstGeom>
+            <a:noFill/>
           </p:spPr>
-        </p:pic>
+          <p:txBody>
+            <a:bodyPr wrap="square" rtlCol="0">
+              <a:spAutoFit/>
+            </a:bodyPr>
+            <a:lstStyle/>
+            <a:p>
+              <a:r>
+                <a:rPr lang="en-US" sz="1000" dirty="0"/>
+                <a:t>1 layered-Sigmoid</a:t>
+              </a:r>
+            </a:p>
+          </p:txBody>
+        </p:sp>
+        <p:sp>
+          <p:nvSpPr>
+            <p:cNvPr id="19" name="TextBox 18">
+              <a:extLst>
+                <a:ext uri="{FF2B5EF4-FFF2-40B4-BE49-F238E27FC236}">
+                  <a16:creationId xmlns:a16="http://schemas.microsoft.com/office/drawing/2014/main" id="{36605852-5E10-9DBD-9CD2-F6880D21AEAF}"/>
+                </a:ext>
+              </a:extLst>
+            </p:cNvPr>
+            <p:cNvSpPr txBox="1"/>
+            <p:nvPr/>
+          </p:nvSpPr>
+          <p:spPr>
+            <a:xfrm>
+              <a:off x="10508974" y="2521664"/>
+              <a:ext cx="1265583" cy="246221"/>
+            </a:xfrm>
+            <a:prstGeom prst="rect">
+              <a:avLst/>
+            </a:prstGeom>
+            <a:noFill/>
+          </p:spPr>
+          <p:txBody>
+            <a:bodyPr wrap="square" rtlCol="0">
+              <a:spAutoFit/>
+            </a:bodyPr>
+            <a:lstStyle/>
+            <a:p>
+              <a:r>
+                <a:rPr lang="en-US" sz="1000" dirty="0"/>
+                <a:t>2 layered-Sigmoid</a:t>
+              </a:r>
+            </a:p>
+          </p:txBody>
+        </p:sp>
+        <p:sp>
+          <p:nvSpPr>
+            <p:cNvPr id="20" name="TextBox 19">
+              <a:extLst>
+                <a:ext uri="{FF2B5EF4-FFF2-40B4-BE49-F238E27FC236}">
+                  <a16:creationId xmlns:a16="http://schemas.microsoft.com/office/drawing/2014/main" id="{B94DE742-B77E-71DD-8FBD-8D4A47911DCA}"/>
+                </a:ext>
+              </a:extLst>
+            </p:cNvPr>
+            <p:cNvSpPr txBox="1"/>
+            <p:nvPr/>
+          </p:nvSpPr>
+          <p:spPr>
+            <a:xfrm>
+              <a:off x="10508974" y="2740761"/>
+              <a:ext cx="1159565" cy="246221"/>
+            </a:xfrm>
+            <a:prstGeom prst="rect">
+              <a:avLst/>
+            </a:prstGeom>
+            <a:noFill/>
+          </p:spPr>
+          <p:txBody>
+            <a:bodyPr wrap="square" rtlCol="0">
+              <a:spAutoFit/>
+            </a:bodyPr>
+            <a:lstStyle/>
+            <a:p>
+              <a:r>
+                <a:rPr lang="en-US" sz="1000" dirty="0"/>
+                <a:t>2 layered-</a:t>
+              </a:r>
+              <a:r>
+                <a:rPr lang="en-US" sz="1000" dirty="0" err="1"/>
+                <a:t>ReLu</a:t>
+              </a:r>
+              <a:endParaRPr lang="en-US" sz="1000" dirty="0"/>
+            </a:p>
+          </p:txBody>
+        </p:sp>
+        <p:sp>
+          <p:nvSpPr>
+            <p:cNvPr id="21" name="TextBox 20">
+              <a:extLst>
+                <a:ext uri="{FF2B5EF4-FFF2-40B4-BE49-F238E27FC236}">
+                  <a16:creationId xmlns:a16="http://schemas.microsoft.com/office/drawing/2014/main" id="{42EB8EEC-A96C-84E7-C4D2-7B5A5534DBA4}"/>
+                </a:ext>
+              </a:extLst>
+            </p:cNvPr>
+            <p:cNvSpPr txBox="1"/>
+            <p:nvPr/>
+          </p:nvSpPr>
+          <p:spPr>
+            <a:xfrm>
+              <a:off x="10508974" y="2970693"/>
+              <a:ext cx="1159565" cy="246221"/>
+            </a:xfrm>
+            <a:prstGeom prst="rect">
+              <a:avLst/>
+            </a:prstGeom>
+            <a:noFill/>
+          </p:spPr>
+          <p:txBody>
+            <a:bodyPr wrap="square" rtlCol="0">
+              <a:spAutoFit/>
+            </a:bodyPr>
+            <a:lstStyle/>
+            <a:p>
+              <a:r>
+                <a:rPr lang="en-US" sz="1000" dirty="0"/>
+                <a:t>2 layered-Tanh</a:t>
+              </a:r>
+            </a:p>
+          </p:txBody>
+        </p:sp>
+      </p:grpSp>
+      <p:grpSp>
+        <p:nvGrpSpPr>
+          <p:cNvPr id="65" name="Group 64">
+            <a:extLst>
+              <a:ext uri="{FF2B5EF4-FFF2-40B4-BE49-F238E27FC236}">
+                <a16:creationId xmlns:a16="http://schemas.microsoft.com/office/drawing/2014/main" id="{E465C77D-A0FF-87F3-EF59-68FD769499E0}"/>
+              </a:ext>
+            </a:extLst>
+          </p:cNvPr>
+          <p:cNvGrpSpPr/>
+          <p:nvPr/>
+        </p:nvGrpSpPr>
+        <p:grpSpPr>
+          <a:xfrm>
+            <a:off x="2514912" y="2090908"/>
+            <a:ext cx="6785162" cy="2291061"/>
+            <a:chOff x="2514912" y="2090908"/>
+            <a:chExt cx="6785162" cy="2291061"/>
+          </a:xfrm>
+        </p:grpSpPr>
         <p:grpSp>
           <p:nvGrpSpPr>
             <p:cNvPr id="16" name="Group 15">
@@ -3724,10 +4135,10 @@
           </p:nvGrpSpPr>
           <p:grpSpPr>
             <a:xfrm>
-              <a:off x="10283689" y="2293145"/>
-              <a:ext cx="1490868" cy="923769"/>
+              <a:off x="4217958" y="2559888"/>
+              <a:ext cx="1493300" cy="923769"/>
               <a:chOff x="10283689" y="2293145"/>
-              <a:chExt cx="1490868" cy="923769"/>
+              <a:chExt cx="1490869" cy="923769"/>
             </a:xfrm>
           </p:grpSpPr>
           <p:sp>
@@ -3931,7 +4342,7 @@
             </p:nvSpPr>
             <p:spPr>
               <a:xfrm>
-                <a:off x="10508974" y="2293145"/>
+                <a:off x="10508975" y="2293145"/>
                 <a:ext cx="1265583" cy="246221"/>
               </a:xfrm>
               <a:prstGeom prst="rect">
@@ -4063,11 +4474,1748 @@
             </p:txBody>
           </p:sp>
         </p:grpSp>
+        <p:pic>
+          <p:nvPicPr>
+            <p:cNvPr id="23" name="Graphic 22">
+              <a:extLst>
+                <a:ext uri="{FF2B5EF4-FFF2-40B4-BE49-F238E27FC236}">
+                  <a16:creationId xmlns:a16="http://schemas.microsoft.com/office/drawing/2014/main" id="{4C9D8052-AC21-11BF-1AE1-E59C6D6EB75E}"/>
+                </a:ext>
+              </a:extLst>
+            </p:cNvPr>
+            <p:cNvPicPr>
+              <a:picLocks noChangeAspect="1"/>
+            </p:cNvPicPr>
+            <p:nvPr/>
+          </p:nvPicPr>
+          <p:blipFill>
+            <a:blip r:embed="rId2">
+              <a:extLst>
+                <a:ext uri="{28A0092B-C50C-407E-A947-70E740481C1C}">
+                  <a14:useLocalDpi xmlns:a14="http://schemas.microsoft.com/office/drawing/2010/main" val="0"/>
+                </a:ext>
+                <a:ext uri="{96DAC541-7B7A-43D3-8B79-37D633B846F1}">
+                  <asvg:svgBlip xmlns:asvg="http://schemas.microsoft.com/office/drawing/2016/SVG/main" r:embed="rId3"/>
+                </a:ext>
+              </a:extLst>
+            </a:blip>
+            <a:stretch>
+              <a:fillRect/>
+            </a:stretch>
+          </p:blipFill>
+          <p:spPr>
+            <a:xfrm>
+              <a:off x="2514912" y="2090908"/>
+              <a:ext cx="3143250" cy="1905000"/>
+            </a:xfrm>
+            <a:prstGeom prst="rect">
+              <a:avLst/>
+            </a:prstGeom>
+          </p:spPr>
+        </p:pic>
+        <p:pic>
+          <p:nvPicPr>
+            <p:cNvPr id="25" name="Graphic 24">
+              <a:extLst>
+                <a:ext uri="{FF2B5EF4-FFF2-40B4-BE49-F238E27FC236}">
+                  <a16:creationId xmlns:a16="http://schemas.microsoft.com/office/drawing/2014/main" id="{B16CFE3B-14EF-BE4A-557A-667359092C47}"/>
+                </a:ext>
+              </a:extLst>
+            </p:cNvPr>
+            <p:cNvPicPr>
+              <a:picLocks noChangeAspect="1"/>
+            </p:cNvPicPr>
+            <p:nvPr/>
+          </p:nvPicPr>
+          <p:blipFill>
+            <a:blip r:embed="rId4">
+              <a:extLst>
+                <a:ext uri="{28A0092B-C50C-407E-A947-70E740481C1C}">
+                  <a14:useLocalDpi xmlns:a14="http://schemas.microsoft.com/office/drawing/2010/main" val="0"/>
+                </a:ext>
+                <a:ext uri="{96DAC541-7B7A-43D3-8B79-37D633B846F1}">
+                  <asvg:svgBlip xmlns:asvg="http://schemas.microsoft.com/office/drawing/2016/SVG/main" r:embed="rId5"/>
+                </a:ext>
+              </a:extLst>
+            </a:blip>
+            <a:stretch>
+              <a:fillRect/>
+            </a:stretch>
+          </p:blipFill>
+          <p:spPr>
+            <a:xfrm>
+              <a:off x="6096000" y="2090908"/>
+              <a:ext cx="3143250" cy="1905000"/>
+            </a:xfrm>
+            <a:prstGeom prst="rect">
+              <a:avLst/>
+            </a:prstGeom>
+          </p:spPr>
+        </p:pic>
+        <p:grpSp>
+          <p:nvGrpSpPr>
+            <p:cNvPr id="44" name="Group 43">
+              <a:extLst>
+                <a:ext uri="{FF2B5EF4-FFF2-40B4-BE49-F238E27FC236}">
+                  <a16:creationId xmlns:a16="http://schemas.microsoft.com/office/drawing/2014/main" id="{AAFC0C3C-4C52-2729-553C-8658AD60F952}"/>
+                </a:ext>
+              </a:extLst>
+            </p:cNvPr>
+            <p:cNvGrpSpPr/>
+            <p:nvPr/>
+          </p:nvGrpSpPr>
+          <p:grpSpPr>
+            <a:xfrm>
+              <a:off x="7806775" y="2559888"/>
+              <a:ext cx="1493299" cy="923769"/>
+              <a:chOff x="10283689" y="2293145"/>
+              <a:chExt cx="1490868" cy="923769"/>
+            </a:xfrm>
+          </p:grpSpPr>
+          <p:sp>
+            <p:nvSpPr>
+              <p:cNvPr id="45" name="Oval 44">
+                <a:extLst>
+                  <a:ext uri="{FF2B5EF4-FFF2-40B4-BE49-F238E27FC236}">
+                    <a16:creationId xmlns:a16="http://schemas.microsoft.com/office/drawing/2014/main" id="{AEB3C47C-DCEF-2B40-5795-E510667A5E93}"/>
+                  </a:ext>
+                </a:extLst>
+              </p:cNvPr>
+              <p:cNvSpPr/>
+              <p:nvPr/>
+            </p:nvSpPr>
+            <p:spPr>
+              <a:xfrm>
+                <a:off x="10283689" y="2343369"/>
+                <a:ext cx="145774" cy="145774"/>
+              </a:xfrm>
+              <a:prstGeom prst="ellipse">
+                <a:avLst/>
+              </a:prstGeom>
+            </p:spPr>
+            <p:style>
+              <a:lnRef idx="1">
+                <a:schemeClr val="dk1"/>
+              </a:lnRef>
+              <a:fillRef idx="2">
+                <a:schemeClr val="dk1"/>
+              </a:fillRef>
+              <a:effectRef idx="1">
+                <a:schemeClr val="dk1"/>
+              </a:effectRef>
+              <a:fontRef idx="minor">
+                <a:schemeClr val="dk1"/>
+              </a:fontRef>
+            </p:style>
+            <p:txBody>
+              <a:bodyPr rtlCol="0" anchor="ctr"/>
+              <a:lstStyle/>
+              <a:p>
+                <a:pPr algn="ctr"/>
+                <a:endParaRPr lang="en-US" dirty="0"/>
+              </a:p>
+            </p:txBody>
+          </p:sp>
+          <p:sp>
+            <p:nvSpPr>
+              <p:cNvPr id="46" name="Oval 45">
+                <a:extLst>
+                  <a:ext uri="{FF2B5EF4-FFF2-40B4-BE49-F238E27FC236}">
+                    <a16:creationId xmlns:a16="http://schemas.microsoft.com/office/drawing/2014/main" id="{F521523E-3A86-FFF2-B28C-A91A422A7CB8}"/>
+                  </a:ext>
+                </a:extLst>
+              </p:cNvPr>
+              <p:cNvSpPr/>
+              <p:nvPr/>
+            </p:nvSpPr>
+            <p:spPr>
+              <a:xfrm>
+                <a:off x="10283689" y="2563974"/>
+                <a:ext cx="145774" cy="145774"/>
+              </a:xfrm>
+              <a:prstGeom prst="ellipse">
+                <a:avLst/>
+              </a:prstGeom>
+            </p:spPr>
+            <p:style>
+              <a:lnRef idx="2">
+                <a:schemeClr val="accent2">
+                  <a:shade val="15000"/>
+                </a:schemeClr>
+              </a:lnRef>
+              <a:fillRef idx="1">
+                <a:schemeClr val="accent2"/>
+              </a:fillRef>
+              <a:effectRef idx="0">
+                <a:schemeClr val="accent2"/>
+              </a:effectRef>
+              <a:fontRef idx="minor">
+                <a:schemeClr val="lt1"/>
+              </a:fontRef>
+            </p:style>
+            <p:txBody>
+              <a:bodyPr rtlCol="0" anchor="ctr"/>
+              <a:lstStyle/>
+              <a:p>
+                <a:pPr algn="ctr"/>
+                <a:endParaRPr lang="en-US"/>
+              </a:p>
+            </p:txBody>
+          </p:sp>
+          <p:sp>
+            <p:nvSpPr>
+              <p:cNvPr id="47" name="Oval 46">
+                <a:extLst>
+                  <a:ext uri="{FF2B5EF4-FFF2-40B4-BE49-F238E27FC236}">
+                    <a16:creationId xmlns:a16="http://schemas.microsoft.com/office/drawing/2014/main" id="{276EAA2F-EDA1-2F5E-B40D-57B8844F0499}"/>
+                  </a:ext>
+                </a:extLst>
+              </p:cNvPr>
+              <p:cNvSpPr/>
+              <p:nvPr/>
+            </p:nvSpPr>
+            <p:spPr>
+              <a:xfrm>
+                <a:off x="10283689" y="2784579"/>
+                <a:ext cx="145774" cy="145774"/>
+              </a:xfrm>
+              <a:prstGeom prst="ellipse">
+                <a:avLst/>
+              </a:prstGeom>
+            </p:spPr>
+            <p:style>
+              <a:lnRef idx="2">
+                <a:schemeClr val="accent4">
+                  <a:shade val="15000"/>
+                </a:schemeClr>
+              </a:lnRef>
+              <a:fillRef idx="1">
+                <a:schemeClr val="accent4"/>
+              </a:fillRef>
+              <a:effectRef idx="0">
+                <a:schemeClr val="accent4"/>
+              </a:effectRef>
+              <a:fontRef idx="minor">
+                <a:schemeClr val="lt1"/>
+              </a:fontRef>
+            </p:style>
+            <p:txBody>
+              <a:bodyPr rtlCol="0" anchor="ctr"/>
+              <a:lstStyle/>
+              <a:p>
+                <a:pPr algn="ctr"/>
+                <a:endParaRPr lang="en-US"/>
+              </a:p>
+            </p:txBody>
+          </p:sp>
+          <p:sp>
+            <p:nvSpPr>
+              <p:cNvPr id="48" name="Oval 47">
+                <a:extLst>
+                  <a:ext uri="{FF2B5EF4-FFF2-40B4-BE49-F238E27FC236}">
+                    <a16:creationId xmlns:a16="http://schemas.microsoft.com/office/drawing/2014/main" id="{C2564B0D-5AAB-D3A2-ABBB-552A4112E95D}"/>
+                  </a:ext>
+                </a:extLst>
+              </p:cNvPr>
+              <p:cNvSpPr/>
+              <p:nvPr/>
+            </p:nvSpPr>
+            <p:spPr>
+              <a:xfrm>
+                <a:off x="10283689" y="3005184"/>
+                <a:ext cx="145774" cy="145774"/>
+              </a:xfrm>
+              <a:prstGeom prst="ellipse">
+                <a:avLst/>
+              </a:prstGeom>
+              <a:solidFill>
+                <a:srgbClr val="C00000"/>
+              </a:solidFill>
+            </p:spPr>
+            <p:style>
+              <a:lnRef idx="2">
+                <a:schemeClr val="accent2">
+                  <a:shade val="15000"/>
+                </a:schemeClr>
+              </a:lnRef>
+              <a:fillRef idx="1">
+                <a:schemeClr val="accent2"/>
+              </a:fillRef>
+              <a:effectRef idx="0">
+                <a:schemeClr val="accent2"/>
+              </a:effectRef>
+              <a:fontRef idx="minor">
+                <a:schemeClr val="lt1"/>
+              </a:fontRef>
+            </p:style>
+            <p:txBody>
+              <a:bodyPr rtlCol="0" anchor="ctr"/>
+              <a:lstStyle/>
+              <a:p>
+                <a:pPr algn="ctr"/>
+                <a:endParaRPr lang="en-US"/>
+              </a:p>
+            </p:txBody>
+          </p:sp>
+          <p:sp>
+            <p:nvSpPr>
+              <p:cNvPr id="49" name="TextBox 48">
+                <a:extLst>
+                  <a:ext uri="{FF2B5EF4-FFF2-40B4-BE49-F238E27FC236}">
+                    <a16:creationId xmlns:a16="http://schemas.microsoft.com/office/drawing/2014/main" id="{61040C27-3584-6918-58F0-2BDD7DFDDCBC}"/>
+                  </a:ext>
+                </a:extLst>
+              </p:cNvPr>
+              <p:cNvSpPr txBox="1"/>
+              <p:nvPr/>
+            </p:nvSpPr>
+            <p:spPr>
+              <a:xfrm>
+                <a:off x="10508974" y="2293145"/>
+                <a:ext cx="1265583" cy="246221"/>
+              </a:xfrm>
+              <a:prstGeom prst="rect">
+                <a:avLst/>
+              </a:prstGeom>
+              <a:noFill/>
+            </p:spPr>
+            <p:txBody>
+              <a:bodyPr wrap="square" rtlCol="0">
+                <a:spAutoFit/>
+              </a:bodyPr>
+              <a:lstStyle/>
+              <a:p>
+                <a:r>
+                  <a:rPr lang="en-US" sz="1000" dirty="0"/>
+                  <a:t>1 layered-Sigmoid</a:t>
+                </a:r>
+              </a:p>
+            </p:txBody>
+          </p:sp>
+          <p:sp>
+            <p:nvSpPr>
+              <p:cNvPr id="50" name="TextBox 49">
+                <a:extLst>
+                  <a:ext uri="{FF2B5EF4-FFF2-40B4-BE49-F238E27FC236}">
+                    <a16:creationId xmlns:a16="http://schemas.microsoft.com/office/drawing/2014/main" id="{97AE0FB0-A117-3F82-0577-744D87F38D10}"/>
+                  </a:ext>
+                </a:extLst>
+              </p:cNvPr>
+              <p:cNvSpPr txBox="1"/>
+              <p:nvPr/>
+            </p:nvSpPr>
+            <p:spPr>
+              <a:xfrm>
+                <a:off x="10508974" y="2521664"/>
+                <a:ext cx="1265583" cy="246221"/>
+              </a:xfrm>
+              <a:prstGeom prst="rect">
+                <a:avLst/>
+              </a:prstGeom>
+              <a:noFill/>
+            </p:spPr>
+            <p:txBody>
+              <a:bodyPr wrap="square" rtlCol="0">
+                <a:spAutoFit/>
+              </a:bodyPr>
+              <a:lstStyle/>
+              <a:p>
+                <a:r>
+                  <a:rPr lang="en-US" sz="1000" dirty="0"/>
+                  <a:t>2 layered-Sigmoid</a:t>
+                </a:r>
+              </a:p>
+            </p:txBody>
+          </p:sp>
+          <p:sp>
+            <p:nvSpPr>
+              <p:cNvPr id="51" name="TextBox 50">
+                <a:extLst>
+                  <a:ext uri="{FF2B5EF4-FFF2-40B4-BE49-F238E27FC236}">
+                    <a16:creationId xmlns:a16="http://schemas.microsoft.com/office/drawing/2014/main" id="{C3D623D5-1EE9-2D8D-2604-9DB429AB18D9}"/>
+                  </a:ext>
+                </a:extLst>
+              </p:cNvPr>
+              <p:cNvSpPr txBox="1"/>
+              <p:nvPr/>
+            </p:nvSpPr>
+            <p:spPr>
+              <a:xfrm>
+                <a:off x="10508974" y="2740761"/>
+                <a:ext cx="1159565" cy="246221"/>
+              </a:xfrm>
+              <a:prstGeom prst="rect">
+                <a:avLst/>
+              </a:prstGeom>
+              <a:noFill/>
+            </p:spPr>
+            <p:txBody>
+              <a:bodyPr wrap="square" rtlCol="0">
+                <a:spAutoFit/>
+              </a:bodyPr>
+              <a:lstStyle/>
+              <a:p>
+                <a:r>
+                  <a:rPr lang="en-US" sz="1000" dirty="0"/>
+                  <a:t>2 layered-</a:t>
+                </a:r>
+                <a:r>
+                  <a:rPr lang="en-US" sz="1000" dirty="0" err="1"/>
+                  <a:t>ReLu</a:t>
+                </a:r>
+                <a:endParaRPr lang="en-US" sz="1000" dirty="0"/>
+              </a:p>
+            </p:txBody>
+          </p:sp>
+          <p:sp>
+            <p:nvSpPr>
+              <p:cNvPr id="52" name="TextBox 51">
+                <a:extLst>
+                  <a:ext uri="{FF2B5EF4-FFF2-40B4-BE49-F238E27FC236}">
+                    <a16:creationId xmlns:a16="http://schemas.microsoft.com/office/drawing/2014/main" id="{893AE786-7C3E-500B-34D2-16F1DCE5F1A8}"/>
+                  </a:ext>
+                </a:extLst>
+              </p:cNvPr>
+              <p:cNvSpPr txBox="1"/>
+              <p:nvPr/>
+            </p:nvSpPr>
+            <p:spPr>
+              <a:xfrm>
+                <a:off x="10508974" y="2970693"/>
+                <a:ext cx="1159565" cy="246221"/>
+              </a:xfrm>
+              <a:prstGeom prst="rect">
+                <a:avLst/>
+              </a:prstGeom>
+              <a:noFill/>
+            </p:spPr>
+            <p:txBody>
+              <a:bodyPr wrap="square" rtlCol="0">
+                <a:spAutoFit/>
+              </a:bodyPr>
+              <a:lstStyle/>
+              <a:p>
+                <a:r>
+                  <a:rPr lang="en-US" sz="1000" dirty="0"/>
+                  <a:t>2 layered-Tanh</a:t>
+                </a:r>
+              </a:p>
+            </p:txBody>
+          </p:sp>
+        </p:grpSp>
+        <p:sp>
+          <p:nvSpPr>
+            <p:cNvPr id="54" name="TextBox 53">
+              <a:extLst>
+                <a:ext uri="{FF2B5EF4-FFF2-40B4-BE49-F238E27FC236}">
+                  <a16:creationId xmlns:a16="http://schemas.microsoft.com/office/drawing/2014/main" id="{E115529C-B577-72CC-4D75-FB7B99DA9E94}"/>
+                </a:ext>
+              </a:extLst>
+            </p:cNvPr>
+            <p:cNvSpPr txBox="1"/>
+            <p:nvPr/>
+          </p:nvSpPr>
+          <p:spPr>
+            <a:xfrm>
+              <a:off x="3832275" y="4012637"/>
+              <a:ext cx="771365" cy="369332"/>
+            </a:xfrm>
+            <a:prstGeom prst="rect">
+              <a:avLst/>
+            </a:prstGeom>
+            <a:noFill/>
+          </p:spPr>
+          <p:txBody>
+            <a:bodyPr wrap="none" rtlCol="0">
+              <a:spAutoFit/>
+            </a:bodyPr>
+            <a:lstStyle/>
+            <a:p>
+              <a:r>
+                <a:rPr lang="en-US" dirty="0"/>
+                <a:t>Adam</a:t>
+              </a:r>
+            </a:p>
+          </p:txBody>
+        </p:sp>
+        <p:sp>
+          <p:nvSpPr>
+            <p:cNvPr id="55" name="TextBox 54">
+              <a:extLst>
+                <a:ext uri="{FF2B5EF4-FFF2-40B4-BE49-F238E27FC236}">
+                  <a16:creationId xmlns:a16="http://schemas.microsoft.com/office/drawing/2014/main" id="{54CF8327-EE66-4E9D-28F0-131380DCE9D3}"/>
+                </a:ext>
+              </a:extLst>
+            </p:cNvPr>
+            <p:cNvSpPr txBox="1"/>
+            <p:nvPr/>
+          </p:nvSpPr>
+          <p:spPr>
+            <a:xfrm>
+              <a:off x="7621059" y="4012637"/>
+              <a:ext cx="636713" cy="369332"/>
+            </a:xfrm>
+            <a:prstGeom prst="rect">
+              <a:avLst/>
+            </a:prstGeom>
+            <a:noFill/>
+          </p:spPr>
+          <p:txBody>
+            <a:bodyPr wrap="none" rtlCol="0">
+              <a:spAutoFit/>
+            </a:bodyPr>
+            <a:lstStyle/>
+            <a:p>
+              <a:r>
+                <a:rPr lang="en-US" dirty="0"/>
+                <a:t>SGD</a:t>
+              </a:r>
+            </a:p>
+          </p:txBody>
+        </p:sp>
+      </p:grpSp>
+      <p:grpSp>
+        <p:nvGrpSpPr>
+          <p:cNvPr id="56" name="Group 55">
+            <a:extLst>
+              <a:ext uri="{FF2B5EF4-FFF2-40B4-BE49-F238E27FC236}">
+                <a16:creationId xmlns:a16="http://schemas.microsoft.com/office/drawing/2014/main" id="{5EC25340-4C4C-47C8-C31C-6D4A7B5680DE}"/>
+              </a:ext>
+            </a:extLst>
+          </p:cNvPr>
+          <p:cNvGrpSpPr/>
+          <p:nvPr/>
+        </p:nvGrpSpPr>
+        <p:grpSpPr>
+          <a:xfrm>
+            <a:off x="9927123" y="2559888"/>
+            <a:ext cx="1493299" cy="923769"/>
+            <a:chOff x="10283689" y="2293145"/>
+            <a:chExt cx="1490868" cy="923769"/>
+          </a:xfrm>
+        </p:grpSpPr>
+        <p:sp>
+          <p:nvSpPr>
+            <p:cNvPr id="57" name="Oval 56">
+              <a:extLst>
+                <a:ext uri="{FF2B5EF4-FFF2-40B4-BE49-F238E27FC236}">
+                  <a16:creationId xmlns:a16="http://schemas.microsoft.com/office/drawing/2014/main" id="{469A97EE-04B8-7466-C8AF-7C25AB0E3A47}"/>
+                </a:ext>
+              </a:extLst>
+            </p:cNvPr>
+            <p:cNvSpPr/>
+            <p:nvPr/>
+          </p:nvSpPr>
+          <p:spPr>
+            <a:xfrm>
+              <a:off x="10283689" y="2343369"/>
+              <a:ext cx="145774" cy="145774"/>
+            </a:xfrm>
+            <a:prstGeom prst="ellipse">
+              <a:avLst/>
+            </a:prstGeom>
+          </p:spPr>
+          <p:style>
+            <a:lnRef idx="1">
+              <a:schemeClr val="dk1"/>
+            </a:lnRef>
+            <a:fillRef idx="2">
+              <a:schemeClr val="dk1"/>
+            </a:fillRef>
+            <a:effectRef idx="1">
+              <a:schemeClr val="dk1"/>
+            </a:effectRef>
+            <a:fontRef idx="minor">
+              <a:schemeClr val="dk1"/>
+            </a:fontRef>
+          </p:style>
+          <p:txBody>
+            <a:bodyPr rtlCol="0" anchor="ctr"/>
+            <a:lstStyle/>
+            <a:p>
+              <a:pPr algn="ctr"/>
+              <a:endParaRPr lang="en-US" dirty="0"/>
+            </a:p>
+          </p:txBody>
+        </p:sp>
+        <p:sp>
+          <p:nvSpPr>
+            <p:cNvPr id="58" name="Oval 57">
+              <a:extLst>
+                <a:ext uri="{FF2B5EF4-FFF2-40B4-BE49-F238E27FC236}">
+                  <a16:creationId xmlns:a16="http://schemas.microsoft.com/office/drawing/2014/main" id="{6FEBB1CB-05CD-E216-3403-CB5F48946CF5}"/>
+                </a:ext>
+              </a:extLst>
+            </p:cNvPr>
+            <p:cNvSpPr/>
+            <p:nvPr/>
+          </p:nvSpPr>
+          <p:spPr>
+            <a:xfrm>
+              <a:off x="10283689" y="2563974"/>
+              <a:ext cx="145774" cy="145774"/>
+            </a:xfrm>
+            <a:prstGeom prst="ellipse">
+              <a:avLst/>
+            </a:prstGeom>
+          </p:spPr>
+          <p:style>
+            <a:lnRef idx="2">
+              <a:schemeClr val="accent2">
+                <a:shade val="15000"/>
+              </a:schemeClr>
+            </a:lnRef>
+            <a:fillRef idx="1">
+              <a:schemeClr val="accent2"/>
+            </a:fillRef>
+            <a:effectRef idx="0">
+              <a:schemeClr val="accent2"/>
+            </a:effectRef>
+            <a:fontRef idx="minor">
+              <a:schemeClr val="lt1"/>
+            </a:fontRef>
+          </p:style>
+          <p:txBody>
+            <a:bodyPr rtlCol="0" anchor="ctr"/>
+            <a:lstStyle/>
+            <a:p>
+              <a:pPr algn="ctr"/>
+              <a:endParaRPr lang="en-US"/>
+            </a:p>
+          </p:txBody>
+        </p:sp>
+        <p:sp>
+          <p:nvSpPr>
+            <p:cNvPr id="59" name="Oval 58">
+              <a:extLst>
+                <a:ext uri="{FF2B5EF4-FFF2-40B4-BE49-F238E27FC236}">
+                  <a16:creationId xmlns:a16="http://schemas.microsoft.com/office/drawing/2014/main" id="{8C159FDD-007D-414B-9AFE-C344C83EFB3C}"/>
+                </a:ext>
+              </a:extLst>
+            </p:cNvPr>
+            <p:cNvSpPr/>
+            <p:nvPr/>
+          </p:nvSpPr>
+          <p:spPr>
+            <a:xfrm>
+              <a:off x="10283689" y="2784579"/>
+              <a:ext cx="145774" cy="145774"/>
+            </a:xfrm>
+            <a:prstGeom prst="ellipse">
+              <a:avLst/>
+            </a:prstGeom>
+          </p:spPr>
+          <p:style>
+            <a:lnRef idx="2">
+              <a:schemeClr val="accent4">
+                <a:shade val="15000"/>
+              </a:schemeClr>
+            </a:lnRef>
+            <a:fillRef idx="1">
+              <a:schemeClr val="accent4"/>
+            </a:fillRef>
+            <a:effectRef idx="0">
+              <a:schemeClr val="accent4"/>
+            </a:effectRef>
+            <a:fontRef idx="minor">
+              <a:schemeClr val="lt1"/>
+            </a:fontRef>
+          </p:style>
+          <p:txBody>
+            <a:bodyPr rtlCol="0" anchor="ctr"/>
+            <a:lstStyle/>
+            <a:p>
+              <a:pPr algn="ctr"/>
+              <a:endParaRPr lang="en-US"/>
+            </a:p>
+          </p:txBody>
+        </p:sp>
+        <p:sp>
+          <p:nvSpPr>
+            <p:cNvPr id="60" name="Oval 59">
+              <a:extLst>
+                <a:ext uri="{FF2B5EF4-FFF2-40B4-BE49-F238E27FC236}">
+                  <a16:creationId xmlns:a16="http://schemas.microsoft.com/office/drawing/2014/main" id="{8DCDE913-DB81-9107-FDA0-D8AEBF12C1EF}"/>
+                </a:ext>
+              </a:extLst>
+            </p:cNvPr>
+            <p:cNvSpPr/>
+            <p:nvPr/>
+          </p:nvSpPr>
+          <p:spPr>
+            <a:xfrm>
+              <a:off x="10283689" y="3005184"/>
+              <a:ext cx="145774" cy="145774"/>
+            </a:xfrm>
+            <a:prstGeom prst="ellipse">
+              <a:avLst/>
+            </a:prstGeom>
+            <a:solidFill>
+              <a:srgbClr val="C00000"/>
+            </a:solidFill>
+          </p:spPr>
+          <p:style>
+            <a:lnRef idx="2">
+              <a:schemeClr val="accent2">
+                <a:shade val="15000"/>
+              </a:schemeClr>
+            </a:lnRef>
+            <a:fillRef idx="1">
+              <a:schemeClr val="accent2"/>
+            </a:fillRef>
+            <a:effectRef idx="0">
+              <a:schemeClr val="accent2"/>
+            </a:effectRef>
+            <a:fontRef idx="minor">
+              <a:schemeClr val="lt1"/>
+            </a:fontRef>
+          </p:style>
+          <p:txBody>
+            <a:bodyPr rtlCol="0" anchor="ctr"/>
+            <a:lstStyle/>
+            <a:p>
+              <a:pPr algn="ctr"/>
+              <a:endParaRPr lang="en-US"/>
+            </a:p>
+          </p:txBody>
+        </p:sp>
+        <p:sp>
+          <p:nvSpPr>
+            <p:cNvPr id="61" name="TextBox 60">
+              <a:extLst>
+                <a:ext uri="{FF2B5EF4-FFF2-40B4-BE49-F238E27FC236}">
+                  <a16:creationId xmlns:a16="http://schemas.microsoft.com/office/drawing/2014/main" id="{FCBE1398-B12B-67D9-945C-8F687CDA5A8F}"/>
+                </a:ext>
+              </a:extLst>
+            </p:cNvPr>
+            <p:cNvSpPr txBox="1"/>
+            <p:nvPr/>
+          </p:nvSpPr>
+          <p:spPr>
+            <a:xfrm>
+              <a:off x="10508974" y="2293145"/>
+              <a:ext cx="1265583" cy="246221"/>
+            </a:xfrm>
+            <a:prstGeom prst="rect">
+              <a:avLst/>
+            </a:prstGeom>
+            <a:noFill/>
+          </p:spPr>
+          <p:txBody>
+            <a:bodyPr wrap="square" rtlCol="0">
+              <a:spAutoFit/>
+            </a:bodyPr>
+            <a:lstStyle/>
+            <a:p>
+              <a:r>
+                <a:rPr lang="en-US" sz="1000" dirty="0"/>
+                <a:t>1 layered-Sigmoid</a:t>
+              </a:r>
+            </a:p>
+          </p:txBody>
+        </p:sp>
+        <p:sp>
+          <p:nvSpPr>
+            <p:cNvPr id="62" name="TextBox 61">
+              <a:extLst>
+                <a:ext uri="{FF2B5EF4-FFF2-40B4-BE49-F238E27FC236}">
+                  <a16:creationId xmlns:a16="http://schemas.microsoft.com/office/drawing/2014/main" id="{8ED054B9-7C44-C84B-3005-9F3B58BA81C3}"/>
+                </a:ext>
+              </a:extLst>
+            </p:cNvPr>
+            <p:cNvSpPr txBox="1"/>
+            <p:nvPr/>
+          </p:nvSpPr>
+          <p:spPr>
+            <a:xfrm>
+              <a:off x="10508974" y="2521664"/>
+              <a:ext cx="1265583" cy="246221"/>
+            </a:xfrm>
+            <a:prstGeom prst="rect">
+              <a:avLst/>
+            </a:prstGeom>
+            <a:noFill/>
+          </p:spPr>
+          <p:txBody>
+            <a:bodyPr wrap="square" rtlCol="0">
+              <a:spAutoFit/>
+            </a:bodyPr>
+            <a:lstStyle/>
+            <a:p>
+              <a:r>
+                <a:rPr lang="en-US" sz="1000" dirty="0"/>
+                <a:t>2 layered-Sigmoid</a:t>
+              </a:r>
+            </a:p>
+          </p:txBody>
+        </p:sp>
+        <p:sp>
+          <p:nvSpPr>
+            <p:cNvPr id="63" name="TextBox 62">
+              <a:extLst>
+                <a:ext uri="{FF2B5EF4-FFF2-40B4-BE49-F238E27FC236}">
+                  <a16:creationId xmlns:a16="http://schemas.microsoft.com/office/drawing/2014/main" id="{BA66CF44-B51C-9427-83B8-6569128CCBE5}"/>
+                </a:ext>
+              </a:extLst>
+            </p:cNvPr>
+            <p:cNvSpPr txBox="1"/>
+            <p:nvPr/>
+          </p:nvSpPr>
+          <p:spPr>
+            <a:xfrm>
+              <a:off x="10508974" y="2740761"/>
+              <a:ext cx="1159565" cy="246221"/>
+            </a:xfrm>
+            <a:prstGeom prst="rect">
+              <a:avLst/>
+            </a:prstGeom>
+            <a:noFill/>
+          </p:spPr>
+          <p:txBody>
+            <a:bodyPr wrap="square" rtlCol="0">
+              <a:spAutoFit/>
+            </a:bodyPr>
+            <a:lstStyle/>
+            <a:p>
+              <a:r>
+                <a:rPr lang="en-US" sz="1000" dirty="0"/>
+                <a:t>2 layered-</a:t>
+              </a:r>
+              <a:r>
+                <a:rPr lang="en-US" sz="1000" dirty="0" err="1"/>
+                <a:t>ReLu</a:t>
+              </a:r>
+              <a:endParaRPr lang="en-US" sz="1000" dirty="0"/>
+            </a:p>
+          </p:txBody>
+        </p:sp>
+        <p:sp>
+          <p:nvSpPr>
+            <p:cNvPr id="64" name="TextBox 63">
+              <a:extLst>
+                <a:ext uri="{FF2B5EF4-FFF2-40B4-BE49-F238E27FC236}">
+                  <a16:creationId xmlns:a16="http://schemas.microsoft.com/office/drawing/2014/main" id="{ABAF3356-838F-7AB8-DD7F-3A54723D8189}"/>
+                </a:ext>
+              </a:extLst>
+            </p:cNvPr>
+            <p:cNvSpPr txBox="1"/>
+            <p:nvPr/>
+          </p:nvSpPr>
+          <p:spPr>
+            <a:xfrm>
+              <a:off x="10508974" y="2970693"/>
+              <a:ext cx="1159565" cy="246221"/>
+            </a:xfrm>
+            <a:prstGeom prst="rect">
+              <a:avLst/>
+            </a:prstGeom>
+            <a:noFill/>
+          </p:spPr>
+          <p:txBody>
+            <a:bodyPr wrap="square" rtlCol="0">
+              <a:spAutoFit/>
+            </a:bodyPr>
+            <a:lstStyle/>
+            <a:p>
+              <a:r>
+                <a:rPr lang="en-US" sz="1000" dirty="0"/>
+                <a:t>2 layered-Tanh</a:t>
+              </a:r>
+            </a:p>
+          </p:txBody>
+        </p:sp>
       </p:grpSp>
     </p:spTree>
     <p:extLst>
       <p:ext uri="{BB962C8B-B14F-4D97-AF65-F5344CB8AC3E}">
         <p14:creationId xmlns:p14="http://schemas.microsoft.com/office/powerpoint/2010/main" val="976205970"/>
+      </p:ext>
+    </p:extLst>
+  </p:cSld>
+  <p:clrMapOvr>
+    <a:masterClrMapping/>
+  </p:clrMapOvr>
+</p:sld>
+</file>
+
+<file path=ppt/slides/slide5.xml><?xml version="1.0" encoding="utf-8"?>
+<p:sld xmlns:a="http://schemas.openxmlformats.org/drawingml/2006/main" xmlns:r="http://schemas.openxmlformats.org/officeDocument/2006/relationships" xmlns:p="http://schemas.openxmlformats.org/presentationml/2006/main">
+  <p:cSld>
+    <p:spTree>
+      <p:nvGrpSpPr>
+        <p:cNvPr id="1" name=""/>
+        <p:cNvGrpSpPr/>
+        <p:nvPr/>
+      </p:nvGrpSpPr>
+      <p:grpSpPr>
+        <a:xfrm>
+          <a:off x="0" y="0"/>
+          <a:ext cx="0" cy="0"/>
+          <a:chOff x="0" y="0"/>
+          <a:chExt cx="0" cy="0"/>
+        </a:xfrm>
+      </p:grpSpPr>
+      <p:sp>
+        <p:nvSpPr>
+          <p:cNvPr id="2" name="Title 1">
+            <a:extLst>
+              <a:ext uri="{FF2B5EF4-FFF2-40B4-BE49-F238E27FC236}">
+                <a16:creationId xmlns:a16="http://schemas.microsoft.com/office/drawing/2014/main" id="{20292B2B-D8D3-878C-F766-99EE5308117A}"/>
+              </a:ext>
+            </a:extLst>
+          </p:cNvPr>
+          <p:cNvSpPr>
+            <a:spLocks noGrp="1"/>
+          </p:cNvSpPr>
+          <p:nvPr>
+            <p:ph type="title"/>
+          </p:nvPr>
+        </p:nvSpPr>
+        <p:spPr>
+          <a:xfrm>
+            <a:off x="838200" y="365125"/>
+            <a:ext cx="1520687" cy="1325563"/>
+          </a:xfrm>
+        </p:spPr>
+        <p:txBody>
+          <a:bodyPr/>
+          <a:lstStyle/>
+          <a:p>
+            <a:r>
+              <a:rPr lang="en-US" dirty="0"/>
+              <a:t>Loss</a:t>
+            </a:r>
+          </a:p>
+        </p:txBody>
+      </p:sp>
+      <p:grpSp>
+        <p:nvGrpSpPr>
+          <p:cNvPr id="42" name="Group 41">
+            <a:extLst>
+              <a:ext uri="{FF2B5EF4-FFF2-40B4-BE49-F238E27FC236}">
+                <a16:creationId xmlns:a16="http://schemas.microsoft.com/office/drawing/2014/main" id="{DEBDAFCF-4847-9FB6-B44E-32757C216B73}"/>
+              </a:ext>
+            </a:extLst>
+          </p:cNvPr>
+          <p:cNvGrpSpPr/>
+          <p:nvPr/>
+        </p:nvGrpSpPr>
+        <p:grpSpPr>
+          <a:xfrm>
+            <a:off x="0" y="1885724"/>
+            <a:ext cx="10437440" cy="3259791"/>
+            <a:chOff x="0" y="1885724"/>
+            <a:chExt cx="10437440" cy="3259791"/>
+          </a:xfrm>
+        </p:grpSpPr>
+        <p:pic>
+          <p:nvPicPr>
+            <p:cNvPr id="5" name="Graphic 4">
+              <a:extLst>
+                <a:ext uri="{FF2B5EF4-FFF2-40B4-BE49-F238E27FC236}">
+                  <a16:creationId xmlns:a16="http://schemas.microsoft.com/office/drawing/2014/main" id="{57F12260-6D62-7656-9138-59EDB29EA606}"/>
+                </a:ext>
+              </a:extLst>
+            </p:cNvPr>
+            <p:cNvPicPr>
+              <a:picLocks noChangeAspect="1"/>
+            </p:cNvPicPr>
+            <p:nvPr/>
+          </p:nvPicPr>
+          <p:blipFill>
+            <a:blip r:embed="rId2">
+              <a:extLst>
+                <a:ext uri="{28A0092B-C50C-407E-A947-70E740481C1C}">
+                  <a14:useLocalDpi xmlns:a14="http://schemas.microsoft.com/office/drawing/2010/main" val="0"/>
+                </a:ext>
+                <a:ext uri="{96DAC541-7B7A-43D3-8B79-37D633B846F1}">
+                  <asvg:svgBlip xmlns:asvg="http://schemas.microsoft.com/office/drawing/2016/SVG/main" r:embed="rId3"/>
+                </a:ext>
+              </a:extLst>
+            </a:blip>
+            <a:stretch>
+              <a:fillRect/>
+            </a:stretch>
+          </p:blipFill>
+          <p:spPr>
+            <a:xfrm>
+              <a:off x="0" y="1885724"/>
+              <a:ext cx="4752147" cy="2880089"/>
+            </a:xfrm>
+            <a:prstGeom prst="rect">
+              <a:avLst/>
+            </a:prstGeom>
+          </p:spPr>
+        </p:pic>
+        <p:grpSp>
+          <p:nvGrpSpPr>
+            <p:cNvPr id="6" name="Group 5">
+              <a:extLst>
+                <a:ext uri="{FF2B5EF4-FFF2-40B4-BE49-F238E27FC236}">
+                  <a16:creationId xmlns:a16="http://schemas.microsoft.com/office/drawing/2014/main" id="{22966018-0B07-D72C-A414-02C3794343A7}"/>
+                </a:ext>
+              </a:extLst>
+            </p:cNvPr>
+            <p:cNvGrpSpPr/>
+            <p:nvPr/>
+          </p:nvGrpSpPr>
+          <p:grpSpPr>
+            <a:xfrm>
+              <a:off x="4825818" y="1960457"/>
+              <a:ext cx="1493299" cy="923769"/>
+              <a:chOff x="10283689" y="2293145"/>
+              <a:chExt cx="1490868" cy="923769"/>
+            </a:xfrm>
+          </p:grpSpPr>
+          <p:sp>
+            <p:nvSpPr>
+              <p:cNvPr id="7" name="Oval 6">
+                <a:extLst>
+                  <a:ext uri="{FF2B5EF4-FFF2-40B4-BE49-F238E27FC236}">
+                    <a16:creationId xmlns:a16="http://schemas.microsoft.com/office/drawing/2014/main" id="{06AFB155-52F2-CC9A-34C7-3B0D20EDF9F0}"/>
+                  </a:ext>
+                </a:extLst>
+              </p:cNvPr>
+              <p:cNvSpPr/>
+              <p:nvPr/>
+            </p:nvSpPr>
+            <p:spPr>
+              <a:xfrm>
+                <a:off x="10283689" y="2343369"/>
+                <a:ext cx="145774" cy="145774"/>
+              </a:xfrm>
+              <a:prstGeom prst="ellipse">
+                <a:avLst/>
+              </a:prstGeom>
+            </p:spPr>
+            <p:style>
+              <a:lnRef idx="2">
+                <a:schemeClr val="accent2">
+                  <a:shade val="15000"/>
+                </a:schemeClr>
+              </a:lnRef>
+              <a:fillRef idx="1">
+                <a:schemeClr val="accent2"/>
+              </a:fillRef>
+              <a:effectRef idx="0">
+                <a:schemeClr val="accent2"/>
+              </a:effectRef>
+              <a:fontRef idx="minor">
+                <a:schemeClr val="lt1"/>
+              </a:fontRef>
+            </p:style>
+            <p:txBody>
+              <a:bodyPr rtlCol="0" anchor="ctr"/>
+              <a:lstStyle/>
+              <a:p>
+                <a:pPr algn="ctr"/>
+                <a:endParaRPr lang="en-US"/>
+              </a:p>
+            </p:txBody>
+          </p:sp>
+          <p:sp>
+            <p:nvSpPr>
+              <p:cNvPr id="8" name="Oval 7">
+                <a:extLst>
+                  <a:ext uri="{FF2B5EF4-FFF2-40B4-BE49-F238E27FC236}">
+                    <a16:creationId xmlns:a16="http://schemas.microsoft.com/office/drawing/2014/main" id="{860FAB02-407A-CA8C-C0DE-E264267CC120}"/>
+                  </a:ext>
+                </a:extLst>
+              </p:cNvPr>
+              <p:cNvSpPr/>
+              <p:nvPr/>
+            </p:nvSpPr>
+            <p:spPr>
+              <a:xfrm>
+                <a:off x="10283689" y="2563974"/>
+                <a:ext cx="145774" cy="145774"/>
+              </a:xfrm>
+              <a:prstGeom prst="ellipse">
+                <a:avLst/>
+              </a:prstGeom>
+            </p:spPr>
+            <p:style>
+              <a:lnRef idx="2">
+                <a:schemeClr val="accent1">
+                  <a:shade val="15000"/>
+                </a:schemeClr>
+              </a:lnRef>
+              <a:fillRef idx="1">
+                <a:schemeClr val="accent1"/>
+              </a:fillRef>
+              <a:effectRef idx="0">
+                <a:schemeClr val="accent1"/>
+              </a:effectRef>
+              <a:fontRef idx="minor">
+                <a:schemeClr val="lt1"/>
+              </a:fontRef>
+            </p:style>
+            <p:txBody>
+              <a:bodyPr rtlCol="0" anchor="ctr"/>
+              <a:lstStyle/>
+              <a:p>
+                <a:pPr algn="ctr"/>
+                <a:endParaRPr lang="en-US"/>
+              </a:p>
+            </p:txBody>
+          </p:sp>
+          <p:sp>
+            <p:nvSpPr>
+              <p:cNvPr id="9" name="Oval 8">
+                <a:extLst>
+                  <a:ext uri="{FF2B5EF4-FFF2-40B4-BE49-F238E27FC236}">
+                    <a16:creationId xmlns:a16="http://schemas.microsoft.com/office/drawing/2014/main" id="{0FEC5E71-5C0D-C8B4-F563-663C0F0D520C}"/>
+                  </a:ext>
+                </a:extLst>
+              </p:cNvPr>
+              <p:cNvSpPr/>
+              <p:nvPr/>
+            </p:nvSpPr>
+            <p:spPr>
+              <a:xfrm>
+                <a:off x="10283689" y="2784579"/>
+                <a:ext cx="145774" cy="145774"/>
+              </a:xfrm>
+              <a:prstGeom prst="ellipse">
+                <a:avLst/>
+              </a:prstGeom>
+            </p:spPr>
+            <p:style>
+              <a:lnRef idx="2">
+                <a:schemeClr val="accent4">
+                  <a:shade val="15000"/>
+                </a:schemeClr>
+              </a:lnRef>
+              <a:fillRef idx="1">
+                <a:schemeClr val="accent4"/>
+              </a:fillRef>
+              <a:effectRef idx="0">
+                <a:schemeClr val="accent4"/>
+              </a:effectRef>
+              <a:fontRef idx="minor">
+                <a:schemeClr val="lt1"/>
+              </a:fontRef>
+            </p:style>
+            <p:txBody>
+              <a:bodyPr rtlCol="0" anchor="ctr"/>
+              <a:lstStyle/>
+              <a:p>
+                <a:pPr algn="ctr"/>
+                <a:endParaRPr lang="en-US"/>
+              </a:p>
+            </p:txBody>
+          </p:sp>
+          <p:sp>
+            <p:nvSpPr>
+              <p:cNvPr id="10" name="Oval 9">
+                <a:extLst>
+                  <a:ext uri="{FF2B5EF4-FFF2-40B4-BE49-F238E27FC236}">
+                    <a16:creationId xmlns:a16="http://schemas.microsoft.com/office/drawing/2014/main" id="{BCFCDC88-9F55-872F-953E-8221FB186EFD}"/>
+                  </a:ext>
+                </a:extLst>
+              </p:cNvPr>
+              <p:cNvSpPr/>
+              <p:nvPr/>
+            </p:nvSpPr>
+            <p:spPr>
+              <a:xfrm>
+                <a:off x="10283689" y="3005184"/>
+                <a:ext cx="145774" cy="145774"/>
+              </a:xfrm>
+              <a:prstGeom prst="ellipse">
+                <a:avLst/>
+              </a:prstGeom>
+              <a:solidFill>
+                <a:srgbClr val="C00000"/>
+              </a:solidFill>
+            </p:spPr>
+            <p:style>
+              <a:lnRef idx="2">
+                <a:schemeClr val="accent2">
+                  <a:shade val="15000"/>
+                </a:schemeClr>
+              </a:lnRef>
+              <a:fillRef idx="1">
+                <a:schemeClr val="accent2"/>
+              </a:fillRef>
+              <a:effectRef idx="0">
+                <a:schemeClr val="accent2"/>
+              </a:effectRef>
+              <a:fontRef idx="minor">
+                <a:schemeClr val="lt1"/>
+              </a:fontRef>
+            </p:style>
+            <p:txBody>
+              <a:bodyPr rtlCol="0" anchor="ctr"/>
+              <a:lstStyle/>
+              <a:p>
+                <a:pPr algn="ctr"/>
+                <a:endParaRPr lang="en-US"/>
+              </a:p>
+            </p:txBody>
+          </p:sp>
+          <p:sp>
+            <p:nvSpPr>
+              <p:cNvPr id="11" name="TextBox 10">
+                <a:extLst>
+                  <a:ext uri="{FF2B5EF4-FFF2-40B4-BE49-F238E27FC236}">
+                    <a16:creationId xmlns:a16="http://schemas.microsoft.com/office/drawing/2014/main" id="{D68AE91F-5E36-8D4C-CF9E-F4670812EC56}"/>
+                  </a:ext>
+                </a:extLst>
+              </p:cNvPr>
+              <p:cNvSpPr txBox="1"/>
+              <p:nvPr/>
+            </p:nvSpPr>
+            <p:spPr>
+              <a:xfrm>
+                <a:off x="10508974" y="2293145"/>
+                <a:ext cx="1265583" cy="246221"/>
+              </a:xfrm>
+              <a:prstGeom prst="rect">
+                <a:avLst/>
+              </a:prstGeom>
+              <a:noFill/>
+            </p:spPr>
+            <p:txBody>
+              <a:bodyPr wrap="square" rtlCol="0">
+                <a:spAutoFit/>
+              </a:bodyPr>
+              <a:lstStyle/>
+              <a:p>
+                <a:r>
+                  <a:rPr lang="en-US" sz="1000" dirty="0"/>
+                  <a:t>1 layered-Sigmoid</a:t>
+                </a:r>
+              </a:p>
+            </p:txBody>
+          </p:sp>
+          <p:sp>
+            <p:nvSpPr>
+              <p:cNvPr id="12" name="TextBox 11">
+                <a:extLst>
+                  <a:ext uri="{FF2B5EF4-FFF2-40B4-BE49-F238E27FC236}">
+                    <a16:creationId xmlns:a16="http://schemas.microsoft.com/office/drawing/2014/main" id="{3EF42702-C1DB-B429-0280-3CB7F49BE921}"/>
+                  </a:ext>
+                </a:extLst>
+              </p:cNvPr>
+              <p:cNvSpPr txBox="1"/>
+              <p:nvPr/>
+            </p:nvSpPr>
+            <p:spPr>
+              <a:xfrm>
+                <a:off x="10508974" y="2521664"/>
+                <a:ext cx="1265583" cy="246221"/>
+              </a:xfrm>
+              <a:prstGeom prst="rect">
+                <a:avLst/>
+              </a:prstGeom>
+              <a:noFill/>
+            </p:spPr>
+            <p:txBody>
+              <a:bodyPr wrap="square" rtlCol="0">
+                <a:spAutoFit/>
+              </a:bodyPr>
+              <a:lstStyle/>
+              <a:p>
+                <a:r>
+                  <a:rPr lang="en-US" sz="1000" dirty="0"/>
+                  <a:t>2 layered-Sigmoid</a:t>
+                </a:r>
+              </a:p>
+            </p:txBody>
+          </p:sp>
+          <p:sp>
+            <p:nvSpPr>
+              <p:cNvPr id="13" name="TextBox 12">
+                <a:extLst>
+                  <a:ext uri="{FF2B5EF4-FFF2-40B4-BE49-F238E27FC236}">
+                    <a16:creationId xmlns:a16="http://schemas.microsoft.com/office/drawing/2014/main" id="{12551AEA-B487-6434-1A55-0063568EE7F7}"/>
+                  </a:ext>
+                </a:extLst>
+              </p:cNvPr>
+              <p:cNvSpPr txBox="1"/>
+              <p:nvPr/>
+            </p:nvSpPr>
+            <p:spPr>
+              <a:xfrm>
+                <a:off x="10508974" y="2740761"/>
+                <a:ext cx="1159565" cy="246221"/>
+              </a:xfrm>
+              <a:prstGeom prst="rect">
+                <a:avLst/>
+              </a:prstGeom>
+              <a:noFill/>
+            </p:spPr>
+            <p:txBody>
+              <a:bodyPr wrap="square" rtlCol="0">
+                <a:spAutoFit/>
+              </a:bodyPr>
+              <a:lstStyle/>
+              <a:p>
+                <a:r>
+                  <a:rPr lang="en-US" sz="1000" dirty="0"/>
+                  <a:t>2 layered-</a:t>
+                </a:r>
+                <a:r>
+                  <a:rPr lang="en-US" sz="1000" dirty="0" err="1"/>
+                  <a:t>ReLu</a:t>
+                </a:r>
+                <a:endParaRPr lang="en-US" sz="1000" dirty="0"/>
+              </a:p>
+            </p:txBody>
+          </p:sp>
+          <p:sp>
+            <p:nvSpPr>
+              <p:cNvPr id="14" name="TextBox 13">
+                <a:extLst>
+                  <a:ext uri="{FF2B5EF4-FFF2-40B4-BE49-F238E27FC236}">
+                    <a16:creationId xmlns:a16="http://schemas.microsoft.com/office/drawing/2014/main" id="{B7D8E5A0-B2EC-0A6C-2844-21D17873F0BF}"/>
+                  </a:ext>
+                </a:extLst>
+              </p:cNvPr>
+              <p:cNvSpPr txBox="1"/>
+              <p:nvPr/>
+            </p:nvSpPr>
+            <p:spPr>
+              <a:xfrm>
+                <a:off x="10508974" y="2970693"/>
+                <a:ext cx="1159565" cy="246221"/>
+              </a:xfrm>
+              <a:prstGeom prst="rect">
+                <a:avLst/>
+              </a:prstGeom>
+              <a:noFill/>
+            </p:spPr>
+            <p:txBody>
+              <a:bodyPr wrap="square" rtlCol="0">
+                <a:spAutoFit/>
+              </a:bodyPr>
+              <a:lstStyle/>
+              <a:p>
+                <a:r>
+                  <a:rPr lang="en-US" sz="1000" dirty="0"/>
+                  <a:t>2 layered-Tanh</a:t>
+                </a:r>
+              </a:p>
+            </p:txBody>
+          </p:sp>
+        </p:grpSp>
+        <p:sp>
+          <p:nvSpPr>
+            <p:cNvPr id="16" name="TextBox 15">
+              <a:extLst>
+                <a:ext uri="{FF2B5EF4-FFF2-40B4-BE49-F238E27FC236}">
+                  <a16:creationId xmlns:a16="http://schemas.microsoft.com/office/drawing/2014/main" id="{5522B045-9AD2-747D-8146-703656090B07}"/>
+                </a:ext>
+              </a:extLst>
+            </p:cNvPr>
+            <p:cNvSpPr txBox="1"/>
+            <p:nvPr/>
+          </p:nvSpPr>
+          <p:spPr>
+            <a:xfrm>
+              <a:off x="2093596" y="4776183"/>
+              <a:ext cx="2259496" cy="369332"/>
+            </a:xfrm>
+            <a:prstGeom prst="rect">
+              <a:avLst/>
+            </a:prstGeom>
+            <a:noFill/>
+          </p:spPr>
+          <p:txBody>
+            <a:bodyPr wrap="square" rtlCol="0">
+              <a:spAutoFit/>
+            </a:bodyPr>
+            <a:lstStyle/>
+            <a:p>
+              <a:r>
+                <a:rPr lang="en-US" dirty="0"/>
+                <a:t>Training loss</a:t>
+              </a:r>
+            </a:p>
+          </p:txBody>
+        </p:sp>
+        <p:pic>
+          <p:nvPicPr>
+            <p:cNvPr id="18" name="Graphic 17">
+              <a:extLst>
+                <a:ext uri="{FF2B5EF4-FFF2-40B4-BE49-F238E27FC236}">
+                  <a16:creationId xmlns:a16="http://schemas.microsoft.com/office/drawing/2014/main" id="{3899C94D-4984-6F95-5C3F-6492D94C6D66}"/>
+                </a:ext>
+              </a:extLst>
+            </p:cNvPr>
+            <p:cNvPicPr>
+              <a:picLocks noChangeAspect="1"/>
+            </p:cNvPicPr>
+            <p:nvPr/>
+          </p:nvPicPr>
+          <p:blipFill>
+            <a:blip r:embed="rId4">
+              <a:extLst>
+                <a:ext uri="{28A0092B-C50C-407E-A947-70E740481C1C}">
+                  <a14:useLocalDpi xmlns:a14="http://schemas.microsoft.com/office/drawing/2010/main" val="0"/>
+                </a:ext>
+                <a:ext uri="{96DAC541-7B7A-43D3-8B79-37D633B846F1}">
+                  <asvg:svgBlip xmlns:asvg="http://schemas.microsoft.com/office/drawing/2016/SVG/main" r:embed="rId5"/>
+                </a:ext>
+              </a:extLst>
+            </a:blip>
+            <a:stretch>
+              <a:fillRect/>
+            </a:stretch>
+          </p:blipFill>
+          <p:spPr>
+            <a:xfrm>
+              <a:off x="5685293" y="1908272"/>
+              <a:ext cx="4752147" cy="2880089"/>
+            </a:xfrm>
+            <a:prstGeom prst="rect">
+              <a:avLst/>
+            </a:prstGeom>
+          </p:spPr>
+        </p:pic>
+        <p:sp>
+          <p:nvSpPr>
+            <p:cNvPr id="30" name="TextBox 29">
+              <a:extLst>
+                <a:ext uri="{FF2B5EF4-FFF2-40B4-BE49-F238E27FC236}">
+                  <a16:creationId xmlns:a16="http://schemas.microsoft.com/office/drawing/2014/main" id="{A303501B-D0F3-3F87-FD52-ED61D0820E66}"/>
+                </a:ext>
+              </a:extLst>
+            </p:cNvPr>
+            <p:cNvSpPr txBox="1"/>
+            <p:nvPr/>
+          </p:nvSpPr>
+          <p:spPr>
+            <a:xfrm>
+              <a:off x="7838910" y="4776183"/>
+              <a:ext cx="2259496" cy="369332"/>
+            </a:xfrm>
+            <a:prstGeom prst="rect">
+              <a:avLst/>
+            </a:prstGeom>
+            <a:noFill/>
+          </p:spPr>
+          <p:txBody>
+            <a:bodyPr wrap="square" rtlCol="0">
+              <a:spAutoFit/>
+            </a:bodyPr>
+            <a:lstStyle/>
+            <a:p>
+              <a:r>
+                <a:rPr lang="en-US" dirty="0"/>
+                <a:t>Validation loss</a:t>
+              </a:r>
+            </a:p>
+          </p:txBody>
+        </p:sp>
+      </p:grpSp>
+      <p:sp>
+        <p:nvSpPr>
+          <p:cNvPr id="32" name="TextBox 31">
+            <a:extLst>
+              <a:ext uri="{FF2B5EF4-FFF2-40B4-BE49-F238E27FC236}">
+                <a16:creationId xmlns:a16="http://schemas.microsoft.com/office/drawing/2014/main" id="{C451A0F5-13BF-DB4E-D919-76A9EA471F47}"/>
+              </a:ext>
+            </a:extLst>
+          </p:cNvPr>
+          <p:cNvSpPr txBox="1"/>
+          <p:nvPr/>
+        </p:nvSpPr>
+        <p:spPr>
+          <a:xfrm>
+            <a:off x="5710317" y="1234209"/>
+            <a:ext cx="771365" cy="369332"/>
+          </a:xfrm>
+          <a:prstGeom prst="rect">
+            <a:avLst/>
+          </a:prstGeom>
+          <a:noFill/>
+        </p:spPr>
+        <p:txBody>
+          <a:bodyPr wrap="none" rtlCol="0">
+            <a:spAutoFit/>
+          </a:bodyPr>
+          <a:lstStyle/>
+          <a:p>
+            <a:r>
+              <a:rPr lang="en-US" dirty="0"/>
+              <a:t>Adam</a:t>
+            </a:r>
+          </a:p>
+        </p:txBody>
+      </p:sp>
+    </p:spTree>
+    <p:extLst>
+      <p:ext uri="{BB962C8B-B14F-4D97-AF65-F5344CB8AC3E}">
+        <p14:creationId xmlns:p14="http://schemas.microsoft.com/office/powerpoint/2010/main" val="3181038004"/>
+      </p:ext>
+    </p:extLst>
+  </p:cSld>
+  <p:clrMapOvr>
+    <a:masterClrMapping/>
+  </p:clrMapOvr>
+</p:sld>
+</file>
+
+<file path=ppt/slides/slide6.xml><?xml version="1.0" encoding="utf-8"?>
+<p:sld xmlns:a="http://schemas.openxmlformats.org/drawingml/2006/main" xmlns:r="http://schemas.openxmlformats.org/officeDocument/2006/relationships" xmlns:p="http://schemas.openxmlformats.org/presentationml/2006/main">
+  <p:cSld>
+    <p:spTree>
+      <p:nvGrpSpPr>
+        <p:cNvPr id="1" name=""/>
+        <p:cNvGrpSpPr/>
+        <p:nvPr/>
+      </p:nvGrpSpPr>
+      <p:grpSpPr>
+        <a:xfrm>
+          <a:off x="0" y="0"/>
+          <a:ext cx="0" cy="0"/>
+          <a:chOff x="0" y="0"/>
+          <a:chExt cx="0" cy="0"/>
+        </a:xfrm>
+      </p:grpSpPr>
+      <p:sp>
+        <p:nvSpPr>
+          <p:cNvPr id="6" name="Title 1">
+            <a:extLst>
+              <a:ext uri="{FF2B5EF4-FFF2-40B4-BE49-F238E27FC236}">
+                <a16:creationId xmlns:a16="http://schemas.microsoft.com/office/drawing/2014/main" id="{B957DDE8-9C6E-2A28-B056-3666A07B04FE}"/>
+              </a:ext>
+            </a:extLst>
+          </p:cNvPr>
+          <p:cNvSpPr>
+            <a:spLocks noGrp="1"/>
+          </p:cNvSpPr>
+          <p:nvPr>
+            <p:ph type="title"/>
+          </p:nvPr>
+        </p:nvSpPr>
+        <p:spPr>
+          <a:xfrm>
+            <a:off x="838200" y="365125"/>
+            <a:ext cx="1520687" cy="1325563"/>
+          </a:xfrm>
+        </p:spPr>
+        <p:txBody>
+          <a:bodyPr/>
+          <a:lstStyle/>
+          <a:p>
+            <a:r>
+              <a:rPr lang="en-US" dirty="0"/>
+              <a:t>Loss</a:t>
+            </a:r>
+          </a:p>
+        </p:txBody>
+      </p:sp>
+      <p:sp>
+        <p:nvSpPr>
+          <p:cNvPr id="7" name="TextBox 6">
+            <a:extLst>
+              <a:ext uri="{FF2B5EF4-FFF2-40B4-BE49-F238E27FC236}">
+                <a16:creationId xmlns:a16="http://schemas.microsoft.com/office/drawing/2014/main" id="{E64B1BAE-E938-84BA-29BF-115763C215A0}"/>
+              </a:ext>
+            </a:extLst>
+          </p:cNvPr>
+          <p:cNvSpPr txBox="1"/>
+          <p:nvPr/>
+        </p:nvSpPr>
+        <p:spPr>
+          <a:xfrm>
+            <a:off x="5710317" y="1234209"/>
+            <a:ext cx="636713" cy="369332"/>
+          </a:xfrm>
+          <a:prstGeom prst="rect">
+            <a:avLst/>
+          </a:prstGeom>
+          <a:noFill/>
+        </p:spPr>
+        <p:txBody>
+          <a:bodyPr wrap="none" rtlCol="0">
+            <a:spAutoFit/>
+          </a:bodyPr>
+          <a:lstStyle/>
+          <a:p>
+            <a:r>
+              <a:rPr lang="en-US" dirty="0"/>
+              <a:t>SGD</a:t>
+            </a:r>
+          </a:p>
+        </p:txBody>
+      </p:sp>
+      <p:grpSp>
+        <p:nvGrpSpPr>
+          <p:cNvPr id="18" name="Group 17">
+            <a:extLst>
+              <a:ext uri="{FF2B5EF4-FFF2-40B4-BE49-F238E27FC236}">
+                <a16:creationId xmlns:a16="http://schemas.microsoft.com/office/drawing/2014/main" id="{E22FD459-F938-90E9-0399-C98BA5E901C4}"/>
+              </a:ext>
+            </a:extLst>
+          </p:cNvPr>
+          <p:cNvGrpSpPr/>
+          <p:nvPr/>
+        </p:nvGrpSpPr>
+        <p:grpSpPr>
+          <a:xfrm>
+            <a:off x="2284757" y="2390361"/>
+            <a:ext cx="7316691" cy="2386184"/>
+            <a:chOff x="2284757" y="2390361"/>
+            <a:chExt cx="7316691" cy="2386184"/>
+          </a:xfrm>
+        </p:grpSpPr>
+        <p:pic>
+          <p:nvPicPr>
+            <p:cNvPr id="13" name="Graphic 12">
+              <a:extLst>
+                <a:ext uri="{FF2B5EF4-FFF2-40B4-BE49-F238E27FC236}">
+                  <a16:creationId xmlns:a16="http://schemas.microsoft.com/office/drawing/2014/main" id="{81EE2BD4-404F-69E6-5B48-46937BE9D45D}"/>
+                </a:ext>
+              </a:extLst>
+            </p:cNvPr>
+            <p:cNvPicPr>
+              <a:picLocks noChangeAspect="1"/>
+            </p:cNvPicPr>
+            <p:nvPr/>
+          </p:nvPicPr>
+          <p:blipFill>
+            <a:blip r:embed="rId2">
+              <a:extLst>
+                <a:ext uri="{28A0092B-C50C-407E-A947-70E740481C1C}">
+                  <a14:useLocalDpi xmlns:a14="http://schemas.microsoft.com/office/drawing/2010/main" val="0"/>
+                </a:ext>
+                <a:ext uri="{96DAC541-7B7A-43D3-8B79-37D633B846F1}">
+                  <asvg:svgBlip xmlns:asvg="http://schemas.microsoft.com/office/drawing/2016/SVG/main" r:embed="rId3"/>
+                </a:ext>
+              </a:extLst>
+            </a:blip>
+            <a:stretch>
+              <a:fillRect/>
+            </a:stretch>
+          </p:blipFill>
+          <p:spPr>
+            <a:xfrm>
+              <a:off x="2284757" y="2390361"/>
+              <a:ext cx="3143250" cy="1905000"/>
+            </a:xfrm>
+            <a:prstGeom prst="rect">
+              <a:avLst/>
+            </a:prstGeom>
+          </p:spPr>
+        </p:pic>
+        <p:pic>
+          <p:nvPicPr>
+            <p:cNvPr id="15" name="Graphic 14">
+              <a:extLst>
+                <a:ext uri="{FF2B5EF4-FFF2-40B4-BE49-F238E27FC236}">
+                  <a16:creationId xmlns:a16="http://schemas.microsoft.com/office/drawing/2014/main" id="{74A2CCAB-B9FC-47B1-6D7F-E6ADC3CDD55A}"/>
+                </a:ext>
+              </a:extLst>
+            </p:cNvPr>
+            <p:cNvPicPr>
+              <a:picLocks noChangeAspect="1"/>
+            </p:cNvPicPr>
+            <p:nvPr/>
+          </p:nvPicPr>
+          <p:blipFill>
+            <a:blip r:embed="rId4">
+              <a:extLst>
+                <a:ext uri="{28A0092B-C50C-407E-A947-70E740481C1C}">
+                  <a14:useLocalDpi xmlns:a14="http://schemas.microsoft.com/office/drawing/2010/main" val="0"/>
+                </a:ext>
+                <a:ext uri="{96DAC541-7B7A-43D3-8B79-37D633B846F1}">
+                  <asvg:svgBlip xmlns:asvg="http://schemas.microsoft.com/office/drawing/2016/SVG/main" r:embed="rId5"/>
+                </a:ext>
+              </a:extLst>
+            </a:blip>
+            <a:stretch>
+              <a:fillRect/>
+            </a:stretch>
+          </p:blipFill>
+          <p:spPr>
+            <a:xfrm>
+              <a:off x="6347030" y="2390361"/>
+              <a:ext cx="3143250" cy="1905000"/>
+            </a:xfrm>
+            <a:prstGeom prst="rect">
+              <a:avLst/>
+            </a:prstGeom>
+          </p:spPr>
+        </p:pic>
+        <p:sp>
+          <p:nvSpPr>
+            <p:cNvPr id="16" name="TextBox 15">
+              <a:extLst>
+                <a:ext uri="{FF2B5EF4-FFF2-40B4-BE49-F238E27FC236}">
+                  <a16:creationId xmlns:a16="http://schemas.microsoft.com/office/drawing/2014/main" id="{2334FA3D-A3F7-55DA-90FF-75729CDB22A8}"/>
+                </a:ext>
+              </a:extLst>
+            </p:cNvPr>
+            <p:cNvSpPr txBox="1"/>
+            <p:nvPr/>
+          </p:nvSpPr>
+          <p:spPr>
+            <a:xfrm>
+              <a:off x="3450821" y="4407213"/>
+              <a:ext cx="2259496" cy="369332"/>
+            </a:xfrm>
+            <a:prstGeom prst="rect">
+              <a:avLst/>
+            </a:prstGeom>
+            <a:noFill/>
+          </p:spPr>
+          <p:txBody>
+            <a:bodyPr wrap="square" rtlCol="0">
+              <a:spAutoFit/>
+            </a:bodyPr>
+            <a:lstStyle/>
+            <a:p>
+              <a:r>
+                <a:rPr lang="en-US" dirty="0"/>
+                <a:t>Training loss</a:t>
+              </a:r>
+            </a:p>
+          </p:txBody>
+        </p:sp>
+        <p:sp>
+          <p:nvSpPr>
+            <p:cNvPr id="17" name="TextBox 16">
+              <a:extLst>
+                <a:ext uri="{FF2B5EF4-FFF2-40B4-BE49-F238E27FC236}">
+                  <a16:creationId xmlns:a16="http://schemas.microsoft.com/office/drawing/2014/main" id="{C55A996B-5034-CDE3-D48A-E2ADD7E5BE28}"/>
+                </a:ext>
+              </a:extLst>
+            </p:cNvPr>
+            <p:cNvSpPr txBox="1"/>
+            <p:nvPr/>
+          </p:nvSpPr>
+          <p:spPr>
+            <a:xfrm>
+              <a:off x="7341952" y="4407213"/>
+              <a:ext cx="2259496" cy="369332"/>
+            </a:xfrm>
+            <a:prstGeom prst="rect">
+              <a:avLst/>
+            </a:prstGeom>
+            <a:noFill/>
+          </p:spPr>
+          <p:txBody>
+            <a:bodyPr wrap="square" rtlCol="0">
+              <a:spAutoFit/>
+            </a:bodyPr>
+            <a:lstStyle/>
+            <a:p>
+              <a:r>
+                <a:rPr lang="en-US" dirty="0"/>
+                <a:t>Validation loss</a:t>
+              </a:r>
+            </a:p>
+          </p:txBody>
+        </p:sp>
+      </p:grpSp>
+    </p:spTree>
+    <p:extLst>
+      <p:ext uri="{BB962C8B-B14F-4D97-AF65-F5344CB8AC3E}">
+        <p14:creationId xmlns:p14="http://schemas.microsoft.com/office/powerpoint/2010/main" val="3340946617"/>
       </p:ext>
     </p:extLst>
   </p:cSld>

</xml_diff>